<commit_message>
Little optimiztion and change choice style selection from radio button to listbox
</commit_message>
<xml_diff>
--- a/AppIcon.pptx
+++ b/AppIcon.pptx
@@ -104,6 +104,11 @@
       </a:defRPr>
     </a:lvl9pPr>
   </p:defaultTextStyle>
+  <p:extLst>
+    <p:ext uri="{EFAFB233-063F-42B5-8137-9DF3F51BA10A}">
+      <p15:sldGuideLst xmlns:p15="http://schemas.microsoft.com/office/powerpoint/2012/main"/>
+    </p:ext>
+  </p:extLst>
 </p:presentation>
 </file>
 
@@ -238,7 +243,7 @@
           <a:p>
             <a:fld id="{C5FE4084-FD05-412E-B791-C7FAFC4BFF5D}" type="datetimeFigureOut">
               <a:rPr lang="en-US" smtClean="0"/>
-              <a:t>9/17/2016</a:t>
+              <a:t>1/2/2017</a:t>
             </a:fld>
             <a:endParaRPr lang="en-US"/>
           </a:p>
@@ -408,7 +413,7 @@
           <a:p>
             <a:fld id="{C5FE4084-FD05-412E-B791-C7FAFC4BFF5D}" type="datetimeFigureOut">
               <a:rPr lang="en-US" smtClean="0"/>
-              <a:t>9/17/2016</a:t>
+              <a:t>1/2/2017</a:t>
             </a:fld>
             <a:endParaRPr lang="en-US"/>
           </a:p>
@@ -588,7 +593,7 @@
           <a:p>
             <a:fld id="{C5FE4084-FD05-412E-B791-C7FAFC4BFF5D}" type="datetimeFigureOut">
               <a:rPr lang="en-US" smtClean="0"/>
-              <a:t>9/17/2016</a:t>
+              <a:t>1/2/2017</a:t>
             </a:fld>
             <a:endParaRPr lang="en-US"/>
           </a:p>
@@ -758,7 +763,7 @@
           <a:p>
             <a:fld id="{C5FE4084-FD05-412E-B791-C7FAFC4BFF5D}" type="datetimeFigureOut">
               <a:rPr lang="en-US" smtClean="0"/>
-              <a:t>9/17/2016</a:t>
+              <a:t>1/2/2017</a:t>
             </a:fld>
             <a:endParaRPr lang="en-US"/>
           </a:p>
@@ -1004,7 +1009,7 @@
           <a:p>
             <a:fld id="{C5FE4084-FD05-412E-B791-C7FAFC4BFF5D}" type="datetimeFigureOut">
               <a:rPr lang="en-US" smtClean="0"/>
-              <a:t>9/17/2016</a:t>
+              <a:t>1/2/2017</a:t>
             </a:fld>
             <a:endParaRPr lang="en-US"/>
           </a:p>
@@ -1236,7 +1241,7 @@
           <a:p>
             <a:fld id="{C5FE4084-FD05-412E-B791-C7FAFC4BFF5D}" type="datetimeFigureOut">
               <a:rPr lang="en-US" smtClean="0"/>
-              <a:t>9/17/2016</a:t>
+              <a:t>1/2/2017</a:t>
             </a:fld>
             <a:endParaRPr lang="en-US"/>
           </a:p>
@@ -1603,7 +1608,7 @@
           <a:p>
             <a:fld id="{C5FE4084-FD05-412E-B791-C7FAFC4BFF5D}" type="datetimeFigureOut">
               <a:rPr lang="en-US" smtClean="0"/>
-              <a:t>9/17/2016</a:t>
+              <a:t>1/2/2017</a:t>
             </a:fld>
             <a:endParaRPr lang="en-US"/>
           </a:p>
@@ -1721,7 +1726,7 @@
           <a:p>
             <a:fld id="{C5FE4084-FD05-412E-B791-C7FAFC4BFF5D}" type="datetimeFigureOut">
               <a:rPr lang="en-US" smtClean="0"/>
-              <a:t>9/17/2016</a:t>
+              <a:t>1/2/2017</a:t>
             </a:fld>
             <a:endParaRPr lang="en-US"/>
           </a:p>
@@ -1816,7 +1821,7 @@
           <a:p>
             <a:fld id="{C5FE4084-FD05-412E-B791-C7FAFC4BFF5D}" type="datetimeFigureOut">
               <a:rPr lang="en-US" smtClean="0"/>
-              <a:t>9/17/2016</a:t>
+              <a:t>1/2/2017</a:t>
             </a:fld>
             <a:endParaRPr lang="en-US"/>
           </a:p>
@@ -2093,7 +2098,7 @@
           <a:p>
             <a:fld id="{C5FE4084-FD05-412E-B791-C7FAFC4BFF5D}" type="datetimeFigureOut">
               <a:rPr lang="en-US" smtClean="0"/>
-              <a:t>9/17/2016</a:t>
+              <a:t>1/2/2017</a:t>
             </a:fld>
             <a:endParaRPr lang="en-US"/>
           </a:p>
@@ -2346,7 +2351,7 @@
           <a:p>
             <a:fld id="{C5FE4084-FD05-412E-B791-C7FAFC4BFF5D}" type="datetimeFigureOut">
               <a:rPr lang="en-US" smtClean="0"/>
-              <a:t>9/17/2016</a:t>
+              <a:t>1/2/2017</a:t>
             </a:fld>
             <a:endParaRPr lang="en-US"/>
           </a:p>
@@ -2559,7 +2564,7 @@
           <a:p>
             <a:fld id="{C5FE4084-FD05-412E-B791-C7FAFC4BFF5D}" type="datetimeFigureOut">
               <a:rPr lang="en-US" smtClean="0"/>
-              <a:t>9/17/2016</a:t>
+              <a:t>1/2/2017</a:t>
             </a:fld>
             <a:endParaRPr lang="en-US"/>
           </a:p>
@@ -2950,6 +2955,17 @@
 <file path=ppt/slides/slide1.xml><?xml version="1.0" encoding="utf-8"?>
 <p:sld xmlns:a="http://schemas.openxmlformats.org/drawingml/2006/main" xmlns:r="http://schemas.openxmlformats.org/officeDocument/2006/relationships" xmlns:p="http://schemas.openxmlformats.org/presentationml/2006/main">
   <p:cSld>
+    <p:bg>
+      <p:bgPr>
+        <a:solidFill>
+          <a:schemeClr val="tx1">
+            <a:lumMod val="65000"/>
+            <a:lumOff val="35000"/>
+          </a:schemeClr>
+        </a:solidFill>
+        <a:effectLst/>
+      </p:bgPr>
+    </p:bg>
     <p:spTree>
       <p:nvGrpSpPr>
         <p:cNvPr id="1" name=""/>
@@ -2964,749 +2980,1039 @@
           <a:chExt cx="0" cy="0"/>
         </a:xfrm>
       </p:grpSpPr>
-      <p:sp>
-        <p:nvSpPr>
-          <p:cNvPr id="4" name="สี่เหลี่ยมผืนผ้า 3"/>
-          <p:cNvSpPr/>
+      <p:grpSp>
+        <p:nvGrpSpPr>
+          <p:cNvPr id="9" name="กลุ่ม 8"/>
+          <p:cNvGrpSpPr/>
           <p:nvPr/>
-        </p:nvSpPr>
-        <p:spPr>
+        </p:nvGrpSpPr>
+        <p:grpSpPr>
           <a:xfrm>
             <a:off x="1007164" y="1895061"/>
-            <a:ext cx="3600000" cy="3600000"/>
+            <a:ext cx="2160000" cy="2160000"/>
+            <a:chOff x="1007164" y="1895061"/>
+            <a:chExt cx="3600000" cy="3600000"/>
           </a:xfrm>
-          <a:prstGeom prst="rect">
-            <a:avLst/>
-          </a:prstGeom>
-          <a:solidFill>
-            <a:schemeClr val="tx1">
-              <a:lumMod val="85000"/>
-              <a:lumOff val="15000"/>
-            </a:schemeClr>
-          </a:solidFill>
-          <a:ln>
+        </p:grpSpPr>
+        <p:sp>
+          <p:nvSpPr>
+            <p:cNvPr id="4" name="สี่เหลี่ยมผืนผ้า 3"/>
+            <p:cNvSpPr/>
+            <p:nvPr/>
+          </p:nvSpPr>
+          <p:spPr>
+            <a:xfrm>
+              <a:off x="1007164" y="1895061"/>
+              <a:ext cx="3600000" cy="3600000"/>
+            </a:xfrm>
+            <a:prstGeom prst="rect">
+              <a:avLst/>
+            </a:prstGeom>
+            <a:solidFill>
+              <a:schemeClr val="tx1"/>
+            </a:solidFill>
+            <a:ln>
+              <a:noFill/>
+            </a:ln>
+          </p:spPr>
+          <p:style>
+            <a:lnRef idx="2">
+              <a:schemeClr val="accent1">
+                <a:shade val="50000"/>
+              </a:schemeClr>
+            </a:lnRef>
+            <a:fillRef idx="1">
+              <a:schemeClr val="accent1"/>
+            </a:fillRef>
+            <a:effectRef idx="0">
+              <a:schemeClr val="accent1"/>
+            </a:effectRef>
+            <a:fontRef idx="minor">
+              <a:schemeClr val="lt1"/>
+            </a:fontRef>
+          </p:style>
+          <p:txBody>
+            <a:bodyPr rtlCol="0" anchor="ctr"/>
+            <a:lstStyle/>
+            <a:p>
+              <a:pPr algn="ctr"/>
+              <a:endParaRPr lang="en-US">
+                <a:solidFill>
+                  <a:schemeClr val="tx1">
+                    <a:lumMod val="95000"/>
+                    <a:lumOff val="5000"/>
+                  </a:schemeClr>
+                </a:solidFill>
+              </a:endParaRPr>
+            </a:p>
+          </p:txBody>
+        </p:sp>
+        <p:sp>
+          <p:nvSpPr>
+            <p:cNvPr id="5" name="สี่เหลี่ยมผืนผ้า 4"/>
+            <p:cNvSpPr/>
+            <p:nvPr/>
+          </p:nvSpPr>
+          <p:spPr>
+            <a:xfrm>
+              <a:off x="1007164" y="1895061"/>
+              <a:ext cx="3600000" cy="727278"/>
+            </a:xfrm>
+            <a:prstGeom prst="rect">
+              <a:avLst/>
+            </a:prstGeom>
+            <a:solidFill>
+              <a:schemeClr val="tx1"/>
+            </a:solidFill>
+            <a:ln>
+              <a:noFill/>
+            </a:ln>
+          </p:spPr>
+          <p:style>
+            <a:lnRef idx="2">
+              <a:schemeClr val="accent1">
+                <a:shade val="50000"/>
+              </a:schemeClr>
+            </a:lnRef>
+            <a:fillRef idx="1">
+              <a:schemeClr val="accent1"/>
+            </a:fillRef>
+            <a:effectRef idx="0">
+              <a:schemeClr val="accent1"/>
+            </a:effectRef>
+            <a:fontRef idx="minor">
+              <a:schemeClr val="lt1"/>
+            </a:fontRef>
+          </p:style>
+          <p:txBody>
+            <a:bodyPr rtlCol="0" anchor="b"/>
+            <a:lstStyle/>
+            <a:p>
+              <a:r>
+                <a:rPr lang="en-US" sz="1600" dirty="0">
+                  <a:latin typeface="Segoe UI" panose="020B0502040204020203" pitchFamily="34" charset="0"/>
+                  <a:cs typeface="Segoe UI" panose="020B0502040204020203" pitchFamily="34" charset="0"/>
+                </a:rPr>
+                <a:t> </a:t>
+              </a:r>
+              <a:r>
+                <a:rPr lang="en-US" sz="1600" dirty="0">
+                  <a:solidFill>
+                    <a:srgbClr val="FF0000"/>
+                  </a:solidFill>
+                  <a:latin typeface="Segoe UI" panose="020B0502040204020203" pitchFamily="34" charset="0"/>
+                  <a:cs typeface="Segoe UI" panose="020B0502040204020203" pitchFamily="34" charset="0"/>
+                </a:rPr>
+                <a:t>A</a:t>
+              </a:r>
+              <a:r>
+                <a:rPr lang="en-US" sz="1600" dirty="0">
+                  <a:latin typeface="Segoe UI" panose="020B0502040204020203" pitchFamily="34" charset="0"/>
+                  <a:cs typeface="Segoe UI" panose="020B0502040204020203" pitchFamily="34" charset="0"/>
+                </a:rPr>
+                <a:t> B C D E F </a:t>
+              </a:r>
+              <a:r>
+                <a:rPr lang="en-US" sz="1600" dirty="0">
+                  <a:solidFill>
+                    <a:srgbClr val="FF0000"/>
+                  </a:solidFill>
+                  <a:latin typeface="Segoe UI" panose="020B0502040204020203" pitchFamily="34" charset="0"/>
+                  <a:cs typeface="Segoe UI" panose="020B0502040204020203" pitchFamily="34" charset="0"/>
+                </a:rPr>
+                <a:t>G H</a:t>
+              </a:r>
+              <a:r>
+                <a:rPr lang="en-US" sz="1600" dirty="0">
+                  <a:latin typeface="Segoe UI" panose="020B0502040204020203" pitchFamily="34" charset="0"/>
+                  <a:cs typeface="Segoe UI" panose="020B0502040204020203" pitchFamily="34" charset="0"/>
+                </a:rPr>
+                <a:t> I</a:t>
+              </a:r>
+              <a:endParaRPr lang="en-US" sz="800" dirty="0">
+                <a:latin typeface="Segoe UI" panose="020B0502040204020203" pitchFamily="34" charset="0"/>
+                <a:cs typeface="Segoe UI" panose="020B0502040204020203" pitchFamily="34" charset="0"/>
+              </a:endParaRPr>
+            </a:p>
+          </p:txBody>
+        </p:sp>
+        <p:sp>
+          <p:nvSpPr>
+            <p:cNvPr id="6" name="สี่เหลี่ยมผืนผ้า 5"/>
+            <p:cNvSpPr/>
+            <p:nvPr/>
+          </p:nvSpPr>
+          <p:spPr>
+            <a:xfrm>
+              <a:off x="2471444" y="3592134"/>
+              <a:ext cx="715617" cy="424070"/>
+            </a:xfrm>
+            <a:prstGeom prst="rect">
+              <a:avLst/>
+            </a:prstGeom>
+            <a:solidFill>
+              <a:schemeClr val="tx1">
+                <a:lumMod val="75000"/>
+                <a:lumOff val="25000"/>
+              </a:schemeClr>
+            </a:solidFill>
+            <a:ln>
+              <a:noFill/>
+            </a:ln>
+          </p:spPr>
+          <p:style>
+            <a:lnRef idx="2">
+              <a:schemeClr val="accent1">
+                <a:shade val="50000"/>
+              </a:schemeClr>
+            </a:lnRef>
+            <a:fillRef idx="1">
+              <a:schemeClr val="accent1"/>
+            </a:fillRef>
+            <a:effectRef idx="0">
+              <a:schemeClr val="accent1"/>
+            </a:effectRef>
+            <a:fontRef idx="minor">
+              <a:schemeClr val="lt1"/>
+            </a:fontRef>
+          </p:style>
+          <p:txBody>
+            <a:bodyPr rtlCol="0" anchor="ctr"/>
+            <a:lstStyle/>
+            <a:p>
+              <a:pPr algn="ctr"/>
+              <a:r>
+                <a:rPr lang="en-US" sz="1600" dirty="0">
+                  <a:latin typeface="Segoe UI" panose="020B0502040204020203" pitchFamily="34" charset="0"/>
+                  <a:cs typeface="Segoe UI" panose="020B0502040204020203" pitchFamily="34" charset="0"/>
+                </a:rPr>
+                <a:t>S</a:t>
+              </a:r>
+            </a:p>
+          </p:txBody>
+        </p:sp>
+        <p:sp>
+          <p:nvSpPr>
+            <p:cNvPr id="7" name="สี่เหลี่ยมผืนผ้า 6"/>
+            <p:cNvSpPr/>
+            <p:nvPr/>
+          </p:nvSpPr>
+          <p:spPr>
+            <a:xfrm>
+              <a:off x="2471444" y="3083073"/>
+              <a:ext cx="715617" cy="424070"/>
+            </a:xfrm>
+            <a:prstGeom prst="rect">
+              <a:avLst/>
+            </a:prstGeom>
+            <a:solidFill>
+              <a:schemeClr val="tx1">
+                <a:lumMod val="75000"/>
+                <a:lumOff val="25000"/>
+              </a:schemeClr>
+            </a:solidFill>
+            <a:ln>
+              <a:noFill/>
+            </a:ln>
+          </p:spPr>
+          <p:style>
+            <a:lnRef idx="2">
+              <a:schemeClr val="accent1">
+                <a:shade val="50000"/>
+              </a:schemeClr>
+            </a:lnRef>
+            <a:fillRef idx="1">
+              <a:schemeClr val="accent1"/>
+            </a:fillRef>
+            <a:effectRef idx="0">
+              <a:schemeClr val="accent1"/>
+            </a:effectRef>
+            <a:fontRef idx="minor">
+              <a:schemeClr val="lt1"/>
+            </a:fontRef>
+          </p:style>
+          <p:txBody>
+            <a:bodyPr rtlCol="0" anchor="ctr"/>
+            <a:lstStyle/>
+            <a:p>
+              <a:pPr algn="ctr"/>
+              <a:r>
+                <a:rPr lang="en-US" sz="1600" dirty="0">
+                  <a:latin typeface="Segoe UI" panose="020B0502040204020203" pitchFamily="34" charset="0"/>
+                  <a:cs typeface="Segoe UI" panose="020B0502040204020203" pitchFamily="34" charset="0"/>
+                </a:rPr>
+                <a:t>J</a:t>
+              </a:r>
+            </a:p>
+          </p:txBody>
+        </p:sp>
+        <p:sp>
+          <p:nvSpPr>
+            <p:cNvPr id="8" name="สี่เหลี่ยมผืนผ้า 7"/>
+            <p:cNvSpPr/>
+            <p:nvPr/>
+          </p:nvSpPr>
+          <p:spPr>
+            <a:xfrm>
+              <a:off x="2471442" y="4101194"/>
+              <a:ext cx="715617" cy="424070"/>
+            </a:xfrm>
+            <a:prstGeom prst="rect">
+              <a:avLst/>
+            </a:prstGeom>
+            <a:solidFill>
+              <a:schemeClr val="tx1">
+                <a:lumMod val="75000"/>
+                <a:lumOff val="25000"/>
+              </a:schemeClr>
+            </a:solidFill>
+            <a:ln>
+              <a:noFill/>
+            </a:ln>
+          </p:spPr>
+          <p:style>
+            <a:lnRef idx="2">
+              <a:schemeClr val="accent1">
+                <a:shade val="50000"/>
+              </a:schemeClr>
+            </a:lnRef>
+            <a:fillRef idx="1">
+              <a:schemeClr val="accent1"/>
+            </a:fillRef>
+            <a:effectRef idx="0">
+              <a:schemeClr val="accent1"/>
+            </a:effectRef>
+            <a:fontRef idx="minor">
+              <a:schemeClr val="lt1"/>
+            </a:fontRef>
+          </p:style>
+          <p:txBody>
+            <a:bodyPr rtlCol="0" anchor="ctr"/>
+            <a:lstStyle/>
+            <a:p>
+              <a:pPr algn="ctr"/>
+              <a:r>
+                <a:rPr lang="en-US" sz="1600" dirty="0">
+                  <a:latin typeface="Segoe UI" panose="020B0502040204020203" pitchFamily="34" charset="0"/>
+                  <a:cs typeface="Segoe UI" panose="020B0502040204020203" pitchFamily="34" charset="0"/>
+                </a:rPr>
+                <a:t>O</a:t>
+              </a:r>
+            </a:p>
+          </p:txBody>
+        </p:sp>
+        <p:sp>
+          <p:nvSpPr>
+            <p:cNvPr id="10" name="สี่เหลี่ยมผืนผ้า 9"/>
+            <p:cNvSpPr/>
+            <p:nvPr/>
+          </p:nvSpPr>
+          <p:spPr>
+            <a:xfrm>
+              <a:off x="2471442" y="4610256"/>
+              <a:ext cx="715617" cy="424070"/>
+            </a:xfrm>
+            <a:prstGeom prst="rect">
+              <a:avLst/>
+            </a:prstGeom>
+            <a:solidFill>
+              <a:schemeClr val="tx1">
+                <a:lumMod val="75000"/>
+                <a:lumOff val="25000"/>
+              </a:schemeClr>
+            </a:solidFill>
+            <a:ln>
+              <a:noFill/>
+            </a:ln>
+          </p:spPr>
+          <p:style>
+            <a:lnRef idx="2">
+              <a:schemeClr val="accent1">
+                <a:shade val="50000"/>
+              </a:schemeClr>
+            </a:lnRef>
+            <a:fillRef idx="1">
+              <a:schemeClr val="accent1"/>
+            </a:fillRef>
+            <a:effectRef idx="0">
+              <a:schemeClr val="accent1"/>
+            </a:effectRef>
+            <a:fontRef idx="minor">
+              <a:schemeClr val="lt1"/>
+            </a:fontRef>
+          </p:style>
+          <p:txBody>
+            <a:bodyPr rtlCol="0" anchor="ctr"/>
+            <a:lstStyle/>
+            <a:p>
+              <a:pPr algn="ctr"/>
+              <a:r>
+                <a:rPr lang="en-US" sz="1600" dirty="0">
+                  <a:latin typeface="Segoe UI" panose="020B0502040204020203" pitchFamily="34" charset="0"/>
+                  <a:cs typeface="Segoe UI" panose="020B0502040204020203" pitchFamily="34" charset="0"/>
+                </a:rPr>
+                <a:t>N</a:t>
+              </a:r>
+            </a:p>
+          </p:txBody>
+        </p:sp>
+      </p:grpSp>
+      <p:grpSp>
+        <p:nvGrpSpPr>
+          <p:cNvPr id="3" name="กลุ่ม 2"/>
+          <p:cNvGrpSpPr>
+            <a:grpSpLocks noChangeAspect="1"/>
+          </p:cNvGrpSpPr>
+          <p:nvPr/>
+        </p:nvGrpSpPr>
+        <p:grpSpPr>
+          <a:xfrm>
+            <a:off x="3558206" y="1895061"/>
+            <a:ext cx="2160000" cy="2160000"/>
+            <a:chOff x="5121964" y="1895061"/>
+            <a:chExt cx="3600000" cy="3600000"/>
+          </a:xfrm>
+        </p:grpSpPr>
+        <p:sp>
+          <p:nvSpPr>
+            <p:cNvPr id="11" name="สี่เหลี่ยมผืนผ้า 10"/>
+            <p:cNvSpPr/>
+            <p:nvPr/>
+          </p:nvSpPr>
+          <p:spPr>
+            <a:xfrm>
+              <a:off x="5121964" y="1895061"/>
+              <a:ext cx="3600000" cy="3600000"/>
+            </a:xfrm>
+            <a:prstGeom prst="rect">
+              <a:avLst/>
+            </a:prstGeom>
+            <a:solidFill>
+              <a:schemeClr val="tx1"/>
+            </a:solidFill>
+            <a:ln>
+              <a:noFill/>
+            </a:ln>
+          </p:spPr>
+          <p:style>
+            <a:lnRef idx="2">
+              <a:schemeClr val="accent1">
+                <a:shade val="50000"/>
+              </a:schemeClr>
+            </a:lnRef>
+            <a:fillRef idx="1">
+              <a:schemeClr val="accent1"/>
+            </a:fillRef>
+            <a:effectRef idx="0">
+              <a:schemeClr val="accent1"/>
+            </a:effectRef>
+            <a:fontRef idx="minor">
+              <a:schemeClr val="lt1"/>
+            </a:fontRef>
+          </p:style>
+          <p:txBody>
+            <a:bodyPr rtlCol="0" anchor="ctr"/>
+            <a:lstStyle/>
+            <a:p>
+              <a:pPr algn="ctr"/>
+              <a:endParaRPr lang="en-US">
+                <a:solidFill>
+                  <a:schemeClr val="tx1">
+                    <a:lumMod val="95000"/>
+                    <a:lumOff val="5000"/>
+                  </a:schemeClr>
+                </a:solidFill>
+              </a:endParaRPr>
+            </a:p>
+          </p:txBody>
+        </p:sp>
+        <p:sp>
+          <p:nvSpPr>
+            <p:cNvPr id="17" name="กล่องข้อความ 16"/>
+            <p:cNvSpPr txBox="1"/>
+            <p:nvPr/>
+          </p:nvSpPr>
+          <p:spPr>
+            <a:xfrm>
+              <a:off x="5121965" y="2622339"/>
+              <a:ext cx="3599999" cy="1590178"/>
+            </a:xfrm>
+            <a:prstGeom prst="rect">
+              <a:avLst/>
+            </a:prstGeom>
             <a:noFill/>
-          </a:ln>
-        </p:spPr>
-        <p:style>
-          <a:lnRef idx="2">
-            <a:schemeClr val="accent1">
-              <a:shade val="50000"/>
-            </a:schemeClr>
-          </a:lnRef>
-          <a:fillRef idx="1">
-            <a:schemeClr val="accent1"/>
-          </a:fillRef>
-          <a:effectRef idx="0">
-            <a:schemeClr val="accent1"/>
-          </a:effectRef>
-          <a:fontRef idx="minor">
-            <a:schemeClr val="lt1"/>
-          </a:fontRef>
-        </p:style>
-        <p:txBody>
-          <a:bodyPr rtlCol="0" anchor="ctr"/>
-          <a:lstStyle/>
-          <a:p>
-            <a:pPr algn="ctr"/>
-            <a:endParaRPr lang="en-US">
+          </p:spPr>
+          <p:txBody>
+            <a:bodyPr wrap="square" rtlCol="0">
+              <a:spAutoFit/>
+            </a:bodyPr>
+            <a:lstStyle/>
+            <a:p>
+              <a:r>
+                <a:rPr lang="en-US" sz="1400" dirty="0">
+                  <a:solidFill>
+                    <a:schemeClr val="bg1"/>
+                  </a:solidFill>
+                  <a:latin typeface="Segoe UI" panose="020B0502040204020203" pitchFamily="34" charset="0"/>
+                  <a:cs typeface="Segoe UI" panose="020B0502040204020203" pitchFamily="34" charset="0"/>
+                </a:rPr>
+                <a:t>1.J</a:t>
+              </a:r>
+            </a:p>
+            <a:p>
+              <a:r>
+                <a:rPr lang="en-US" sz="1400" dirty="0">
+                  <a:solidFill>
+                    <a:schemeClr val="bg1"/>
+                  </a:solidFill>
+                  <a:latin typeface="Segoe UI" panose="020B0502040204020203" pitchFamily="34" charset="0"/>
+                  <a:cs typeface="Segoe UI" panose="020B0502040204020203" pitchFamily="34" charset="0"/>
+                </a:rPr>
+                <a:t>2.S</a:t>
+              </a:r>
+            </a:p>
+            <a:p>
+              <a:r>
+                <a:rPr lang="en-US" sz="1400" dirty="0">
+                  <a:solidFill>
+                    <a:schemeClr val="bg1"/>
+                  </a:solidFill>
+                  <a:latin typeface="Segoe UI" panose="020B0502040204020203" pitchFamily="34" charset="0"/>
+                  <a:cs typeface="Segoe UI" panose="020B0502040204020203" pitchFamily="34" charset="0"/>
+                </a:rPr>
+                <a:t>3.O</a:t>
+              </a:r>
+            </a:p>
+            <a:p>
+              <a:r>
+                <a:rPr lang="en-US" sz="1400" dirty="0">
+                  <a:solidFill>
+                    <a:schemeClr val="bg1"/>
+                  </a:solidFill>
+                  <a:latin typeface="Segoe UI" panose="020B0502040204020203" pitchFamily="34" charset="0"/>
+                  <a:cs typeface="Segoe UI" panose="020B0502040204020203" pitchFamily="34" charset="0"/>
+                </a:rPr>
+                <a:t>4.N</a:t>
+              </a:r>
+            </a:p>
+          </p:txBody>
+        </p:sp>
+        <p:sp>
+          <p:nvSpPr>
+            <p:cNvPr id="12" name="สี่เหลี่ยมผืนผ้า 11"/>
+            <p:cNvSpPr/>
+            <p:nvPr/>
+          </p:nvSpPr>
+          <p:spPr>
+            <a:xfrm>
+              <a:off x="5121965" y="1895061"/>
+              <a:ext cx="3599999" cy="727278"/>
+            </a:xfrm>
+            <a:prstGeom prst="rect">
+              <a:avLst/>
+            </a:prstGeom>
+            <a:solidFill>
+              <a:schemeClr val="tx1"/>
+            </a:solidFill>
+            <a:ln>
+              <a:noFill/>
+            </a:ln>
+          </p:spPr>
+          <p:style>
+            <a:lnRef idx="2">
+              <a:schemeClr val="accent1">
+                <a:shade val="50000"/>
+              </a:schemeClr>
+            </a:lnRef>
+            <a:fillRef idx="1">
+              <a:schemeClr val="accent1"/>
+            </a:fillRef>
+            <a:effectRef idx="0">
+              <a:schemeClr val="accent1"/>
+            </a:effectRef>
+            <a:fontRef idx="minor">
+              <a:schemeClr val="lt1"/>
+            </a:fontRef>
+          </p:style>
+          <p:txBody>
+            <a:bodyPr rtlCol="0" anchor="b"/>
+            <a:lstStyle/>
+            <a:p>
+              <a:r>
+                <a:rPr lang="en-US" sz="1600" dirty="0">
+                  <a:latin typeface="Segoe UI" panose="020B0502040204020203" pitchFamily="34" charset="0"/>
+                  <a:cs typeface="Segoe UI" panose="020B0502040204020203" pitchFamily="34" charset="0"/>
+                </a:rPr>
+                <a:t> </a:t>
+              </a:r>
+              <a:r>
+                <a:rPr lang="en-US" sz="1600" dirty="0">
+                  <a:solidFill>
+                    <a:srgbClr val="FF0000"/>
+                  </a:solidFill>
+                  <a:latin typeface="Segoe UI" panose="020B0502040204020203" pitchFamily="34" charset="0"/>
+                  <a:cs typeface="Segoe UI" panose="020B0502040204020203" pitchFamily="34" charset="0"/>
+                </a:rPr>
+                <a:t>A</a:t>
+              </a:r>
+              <a:r>
+                <a:rPr lang="en-US" sz="1600" dirty="0">
+                  <a:latin typeface="Segoe UI" panose="020B0502040204020203" pitchFamily="34" charset="0"/>
+                  <a:cs typeface="Segoe UI" panose="020B0502040204020203" pitchFamily="34" charset="0"/>
+                </a:rPr>
+                <a:t> B C D E F </a:t>
+              </a:r>
+              <a:r>
+                <a:rPr lang="en-US" sz="1600" dirty="0">
+                  <a:solidFill>
+                    <a:srgbClr val="FF0000"/>
+                  </a:solidFill>
+                  <a:latin typeface="Segoe UI" panose="020B0502040204020203" pitchFamily="34" charset="0"/>
+                  <a:cs typeface="Segoe UI" panose="020B0502040204020203" pitchFamily="34" charset="0"/>
+                </a:rPr>
+                <a:t>G H</a:t>
+              </a:r>
+              <a:r>
+                <a:rPr lang="en-US" sz="1600" dirty="0">
+                  <a:latin typeface="Segoe UI" panose="020B0502040204020203" pitchFamily="34" charset="0"/>
+                  <a:cs typeface="Segoe UI" panose="020B0502040204020203" pitchFamily="34" charset="0"/>
+                </a:rPr>
+                <a:t> I</a:t>
+              </a:r>
+              <a:endParaRPr lang="en-US" sz="800" dirty="0">
+                <a:latin typeface="Segoe UI" panose="020B0502040204020203" pitchFamily="34" charset="0"/>
+                <a:cs typeface="Segoe UI" panose="020B0502040204020203" pitchFamily="34" charset="0"/>
+              </a:endParaRPr>
+            </a:p>
+          </p:txBody>
+        </p:sp>
+        <p:sp>
+          <p:nvSpPr>
+            <p:cNvPr id="13" name="สี่เหลี่ยมผืนผ้า 12"/>
+            <p:cNvSpPr/>
+            <p:nvPr/>
+          </p:nvSpPr>
+          <p:spPr>
+            <a:xfrm>
+              <a:off x="6136768" y="4928715"/>
+              <a:ext cx="715617" cy="424070"/>
+            </a:xfrm>
+            <a:prstGeom prst="rect">
+              <a:avLst/>
+            </a:prstGeom>
+            <a:solidFill>
+              <a:schemeClr val="tx1">
+                <a:lumMod val="75000"/>
+                <a:lumOff val="25000"/>
+              </a:schemeClr>
+            </a:solidFill>
+            <a:ln>
+              <a:noFill/>
+            </a:ln>
+          </p:spPr>
+          <p:style>
+            <a:lnRef idx="2">
+              <a:schemeClr val="accent1">
+                <a:shade val="50000"/>
+              </a:schemeClr>
+            </a:lnRef>
+            <a:fillRef idx="1">
+              <a:schemeClr val="accent1"/>
+            </a:fillRef>
+            <a:effectRef idx="0">
+              <a:schemeClr val="accent1"/>
+            </a:effectRef>
+            <a:fontRef idx="minor">
+              <a:schemeClr val="lt1"/>
+            </a:fontRef>
+          </p:style>
+          <p:txBody>
+            <a:bodyPr rtlCol="0" anchor="ctr"/>
+            <a:lstStyle/>
+            <a:p>
+              <a:pPr algn="ctr"/>
+              <a:r>
+                <a:rPr lang="en-US" sz="1400" dirty="0">
+                  <a:latin typeface="Segoe UI" panose="020B0502040204020203" pitchFamily="34" charset="0"/>
+                  <a:cs typeface="Segoe UI" panose="020B0502040204020203" pitchFamily="34" charset="0"/>
+                </a:rPr>
+                <a:t>2</a:t>
+              </a:r>
+            </a:p>
+          </p:txBody>
+        </p:sp>
+        <p:sp>
+          <p:nvSpPr>
+            <p:cNvPr id="14" name="สี่เหลี่ยมผืนผ้า 13"/>
+            <p:cNvSpPr/>
+            <p:nvPr/>
+          </p:nvSpPr>
+          <p:spPr>
+            <a:xfrm>
+              <a:off x="5284339" y="4928715"/>
+              <a:ext cx="715617" cy="424070"/>
+            </a:xfrm>
+            <a:prstGeom prst="rect">
+              <a:avLst/>
+            </a:prstGeom>
+            <a:solidFill>
+              <a:schemeClr val="tx1">
+                <a:lumMod val="75000"/>
+                <a:lumOff val="25000"/>
+              </a:schemeClr>
+            </a:solidFill>
+            <a:ln>
+              <a:noFill/>
+            </a:ln>
+          </p:spPr>
+          <p:style>
+            <a:lnRef idx="2">
+              <a:schemeClr val="accent1">
+                <a:shade val="50000"/>
+              </a:schemeClr>
+            </a:lnRef>
+            <a:fillRef idx="1">
+              <a:schemeClr val="accent1"/>
+            </a:fillRef>
+            <a:effectRef idx="0">
+              <a:schemeClr val="accent1"/>
+            </a:effectRef>
+            <a:fontRef idx="minor">
+              <a:schemeClr val="lt1"/>
+            </a:fontRef>
+          </p:style>
+          <p:txBody>
+            <a:bodyPr rtlCol="0" anchor="ctr"/>
+            <a:lstStyle/>
+            <a:p>
+              <a:pPr algn="ctr"/>
+              <a:r>
+                <a:rPr lang="en-US" sz="1400" dirty="0">
+                  <a:latin typeface="Segoe UI" panose="020B0502040204020203" pitchFamily="34" charset="0"/>
+                  <a:cs typeface="Segoe UI" panose="020B0502040204020203" pitchFamily="34" charset="0"/>
+                </a:rPr>
+                <a:t>1</a:t>
+              </a:r>
+            </a:p>
+          </p:txBody>
+        </p:sp>
+        <p:sp>
+          <p:nvSpPr>
+            <p:cNvPr id="15" name="สี่เหลี่ยมผืนผ้า 14"/>
+            <p:cNvSpPr/>
+            <p:nvPr/>
+          </p:nvSpPr>
+          <p:spPr>
+            <a:xfrm>
+              <a:off x="6989197" y="4928715"/>
+              <a:ext cx="715617" cy="424070"/>
+            </a:xfrm>
+            <a:prstGeom prst="rect">
+              <a:avLst/>
+            </a:prstGeom>
+            <a:solidFill>
+              <a:schemeClr val="tx1">
+                <a:lumMod val="75000"/>
+                <a:lumOff val="25000"/>
+              </a:schemeClr>
+            </a:solidFill>
+            <a:ln>
+              <a:noFill/>
+            </a:ln>
+          </p:spPr>
+          <p:style>
+            <a:lnRef idx="2">
+              <a:schemeClr val="accent1">
+                <a:shade val="50000"/>
+              </a:schemeClr>
+            </a:lnRef>
+            <a:fillRef idx="1">
+              <a:schemeClr val="accent1"/>
+            </a:fillRef>
+            <a:effectRef idx="0">
+              <a:schemeClr val="accent1"/>
+            </a:effectRef>
+            <a:fontRef idx="minor">
+              <a:schemeClr val="lt1"/>
+            </a:fontRef>
+          </p:style>
+          <p:txBody>
+            <a:bodyPr rtlCol="0" anchor="ctr"/>
+            <a:lstStyle/>
+            <a:p>
+              <a:pPr algn="ctr"/>
+              <a:r>
+                <a:rPr lang="en-US" sz="1400" dirty="0">
+                  <a:latin typeface="Segoe UI" panose="020B0502040204020203" pitchFamily="34" charset="0"/>
+                  <a:cs typeface="Segoe UI" panose="020B0502040204020203" pitchFamily="34" charset="0"/>
+                </a:rPr>
+                <a:t>3</a:t>
+              </a:r>
+            </a:p>
+          </p:txBody>
+        </p:sp>
+        <p:sp>
+          <p:nvSpPr>
+            <p:cNvPr id="16" name="สี่เหลี่ยมผืนผ้า 15"/>
+            <p:cNvSpPr/>
+            <p:nvPr/>
+          </p:nvSpPr>
+          <p:spPr>
+            <a:xfrm>
+              <a:off x="7841626" y="4928715"/>
+              <a:ext cx="715617" cy="424070"/>
+            </a:xfrm>
+            <a:prstGeom prst="rect">
+              <a:avLst/>
+            </a:prstGeom>
+            <a:solidFill>
+              <a:schemeClr val="tx1">
+                <a:lumMod val="75000"/>
+                <a:lumOff val="25000"/>
+              </a:schemeClr>
+            </a:solidFill>
+            <a:ln>
+              <a:noFill/>
+            </a:ln>
+          </p:spPr>
+          <p:style>
+            <a:lnRef idx="2">
+              <a:schemeClr val="accent1">
+                <a:shade val="50000"/>
+              </a:schemeClr>
+            </a:lnRef>
+            <a:fillRef idx="1">
+              <a:schemeClr val="accent1"/>
+            </a:fillRef>
+            <a:effectRef idx="0">
+              <a:schemeClr val="accent1"/>
+            </a:effectRef>
+            <a:fontRef idx="minor">
+              <a:schemeClr val="lt1"/>
+            </a:fontRef>
+          </p:style>
+          <p:txBody>
+            <a:bodyPr rtlCol="0" anchor="ctr"/>
+            <a:lstStyle/>
+            <a:p>
+              <a:pPr algn="ctr"/>
+              <a:r>
+                <a:rPr lang="en-US" sz="1400" dirty="0">
+                  <a:latin typeface="Segoe UI" panose="020B0502040204020203" pitchFamily="34" charset="0"/>
+                  <a:cs typeface="Segoe UI" panose="020B0502040204020203" pitchFamily="34" charset="0"/>
+                </a:rPr>
+                <a:t>4</a:t>
+              </a:r>
+            </a:p>
+          </p:txBody>
+        </p:sp>
+      </p:grpSp>
+      <p:grpSp>
+        <p:nvGrpSpPr>
+          <p:cNvPr id="27" name="กลุ่ม 26"/>
+          <p:cNvGrpSpPr/>
+          <p:nvPr/>
+        </p:nvGrpSpPr>
+        <p:grpSpPr>
+          <a:xfrm>
+            <a:off x="6109248" y="1895061"/>
+            <a:ext cx="2160000" cy="2160000"/>
+            <a:chOff x="6109248" y="1895061"/>
+            <a:chExt cx="2160000" cy="2160000"/>
+          </a:xfrm>
+        </p:grpSpPr>
+        <p:sp>
+          <p:nvSpPr>
+            <p:cNvPr id="19" name="สี่เหลี่ยมผืนผ้า 18"/>
+            <p:cNvSpPr/>
+            <p:nvPr/>
+          </p:nvSpPr>
+          <p:spPr>
+            <a:xfrm>
+              <a:off x="6109248" y="1895061"/>
+              <a:ext cx="2160000" cy="2160000"/>
+            </a:xfrm>
+            <a:prstGeom prst="rect">
+              <a:avLst/>
+            </a:prstGeom>
+            <a:solidFill>
+              <a:schemeClr val="tx1"/>
+            </a:solidFill>
+            <a:ln>
+              <a:noFill/>
+            </a:ln>
+          </p:spPr>
+          <p:style>
+            <a:lnRef idx="2">
+              <a:schemeClr val="accent1">
+                <a:shade val="50000"/>
+              </a:schemeClr>
+            </a:lnRef>
+            <a:fillRef idx="1">
+              <a:schemeClr val="accent1"/>
+            </a:fillRef>
+            <a:effectRef idx="0">
+              <a:schemeClr val="accent1"/>
+            </a:effectRef>
+            <a:fontRef idx="minor">
+              <a:schemeClr val="lt1"/>
+            </a:fontRef>
+          </p:style>
+          <p:txBody>
+            <a:bodyPr rtlCol="0" anchor="ctr"/>
+            <a:lstStyle/>
+            <a:p>
+              <a:pPr algn="ctr"/>
+              <a:endParaRPr lang="en-US">
+                <a:solidFill>
+                  <a:schemeClr val="tx1">
+                    <a:lumMod val="95000"/>
+                    <a:lumOff val="5000"/>
+                  </a:schemeClr>
+                </a:solidFill>
+              </a:endParaRPr>
+            </a:p>
+          </p:txBody>
+        </p:sp>
+        <p:sp>
+          <p:nvSpPr>
+            <p:cNvPr id="21" name="สี่เหลี่ยมผืนผ้า 20"/>
+            <p:cNvSpPr/>
+            <p:nvPr/>
+          </p:nvSpPr>
+          <p:spPr>
+            <a:xfrm>
+              <a:off x="6109249" y="1895061"/>
+              <a:ext cx="2159999" cy="436367"/>
+            </a:xfrm>
+            <a:prstGeom prst="rect">
+              <a:avLst/>
+            </a:prstGeom>
+            <a:solidFill>
+              <a:schemeClr val="tx1"/>
+            </a:solidFill>
+            <a:ln>
+              <a:noFill/>
+            </a:ln>
+          </p:spPr>
+          <p:style>
+            <a:lnRef idx="2">
+              <a:schemeClr val="accent1">
+                <a:shade val="50000"/>
+              </a:schemeClr>
+            </a:lnRef>
+            <a:fillRef idx="1">
+              <a:schemeClr val="accent1"/>
+            </a:fillRef>
+            <a:effectRef idx="0">
+              <a:schemeClr val="accent1"/>
+            </a:effectRef>
+            <a:fontRef idx="minor">
+              <a:schemeClr val="lt1"/>
+            </a:fontRef>
+          </p:style>
+          <p:txBody>
+            <a:bodyPr rtlCol="0" anchor="b"/>
+            <a:lstStyle/>
+            <a:p>
+              <a:r>
+                <a:rPr lang="en-US" sz="1600" dirty="0">
+                  <a:latin typeface="Segoe UI" panose="020B0502040204020203" pitchFamily="34" charset="0"/>
+                  <a:cs typeface="Segoe UI" panose="020B0502040204020203" pitchFamily="34" charset="0"/>
+                </a:rPr>
+                <a:t> </a:t>
+              </a:r>
+              <a:r>
+                <a:rPr lang="en-US" sz="1600" dirty="0">
+                  <a:solidFill>
+                    <a:srgbClr val="FF0000"/>
+                  </a:solidFill>
+                  <a:latin typeface="Segoe UI" panose="020B0502040204020203" pitchFamily="34" charset="0"/>
+                  <a:cs typeface="Segoe UI" panose="020B0502040204020203" pitchFamily="34" charset="0"/>
+                </a:rPr>
+                <a:t>A</a:t>
+              </a:r>
+              <a:r>
+                <a:rPr lang="en-US" sz="1600" dirty="0">
+                  <a:latin typeface="Segoe UI" panose="020B0502040204020203" pitchFamily="34" charset="0"/>
+                  <a:cs typeface="Segoe UI" panose="020B0502040204020203" pitchFamily="34" charset="0"/>
+                </a:rPr>
+                <a:t> B C D E F </a:t>
+              </a:r>
+              <a:r>
+                <a:rPr lang="en-US" sz="1600" dirty="0">
+                  <a:solidFill>
+                    <a:srgbClr val="FF0000"/>
+                  </a:solidFill>
+                  <a:latin typeface="Segoe UI" panose="020B0502040204020203" pitchFamily="34" charset="0"/>
+                  <a:cs typeface="Segoe UI" panose="020B0502040204020203" pitchFamily="34" charset="0"/>
+                </a:rPr>
+                <a:t>G H</a:t>
+              </a:r>
+              <a:r>
+                <a:rPr lang="en-US" sz="1600" dirty="0">
+                  <a:latin typeface="Segoe UI" panose="020B0502040204020203" pitchFamily="34" charset="0"/>
+                  <a:cs typeface="Segoe UI" panose="020B0502040204020203" pitchFamily="34" charset="0"/>
+                </a:rPr>
+                <a:t> I</a:t>
+              </a:r>
+              <a:endParaRPr lang="en-US" sz="800" dirty="0">
+                <a:latin typeface="Segoe UI" panose="020B0502040204020203" pitchFamily="34" charset="0"/>
+                <a:cs typeface="Segoe UI" panose="020B0502040204020203" pitchFamily="34" charset="0"/>
+              </a:endParaRPr>
+            </a:p>
+          </p:txBody>
+        </p:sp>
+        <p:sp>
+          <p:nvSpPr>
+            <p:cNvPr id="26" name="สี่เหลี่ยมผืนผ้า 25"/>
+            <p:cNvSpPr/>
+            <p:nvPr/>
+          </p:nvSpPr>
+          <p:spPr>
+            <a:xfrm>
+              <a:off x="6314719" y="3113281"/>
+              <a:ext cx="1749057" cy="327151"/>
+            </a:xfrm>
+            <a:prstGeom prst="rect">
+              <a:avLst/>
+            </a:prstGeom>
+            <a:noFill/>
+            <a:ln w="19050">
               <a:solidFill>
                 <a:schemeClr val="tx1">
-                  <a:lumMod val="95000"/>
-                  <a:lumOff val="5000"/>
+                  <a:lumMod val="75000"/>
+                  <a:lumOff val="25000"/>
                 </a:schemeClr>
               </a:solidFill>
-            </a:endParaRPr>
-          </a:p>
-        </p:txBody>
-      </p:sp>
-      <p:sp>
-        <p:nvSpPr>
-          <p:cNvPr id="5" name="สี่เหลี่ยมผืนผ้า 4"/>
-          <p:cNvSpPr/>
-          <p:nvPr/>
-        </p:nvSpPr>
-        <p:spPr>
-          <a:xfrm>
-            <a:off x="1007164" y="1895061"/>
-            <a:ext cx="3600000" cy="993913"/>
-          </a:xfrm>
-          <a:prstGeom prst="rect">
-            <a:avLst/>
-          </a:prstGeom>
-          <a:solidFill>
-            <a:schemeClr val="tx1">
-              <a:lumMod val="75000"/>
-              <a:lumOff val="25000"/>
-            </a:schemeClr>
-          </a:solidFill>
-          <a:ln>
-            <a:noFill/>
-          </a:ln>
-        </p:spPr>
-        <p:style>
-          <a:lnRef idx="2">
-            <a:schemeClr val="accent1">
-              <a:shade val="50000"/>
-            </a:schemeClr>
-          </a:lnRef>
-          <a:fillRef idx="1">
-            <a:schemeClr val="accent1"/>
-          </a:fillRef>
-          <a:effectRef idx="0">
-            <a:schemeClr val="accent1"/>
-          </a:effectRef>
-          <a:fontRef idx="minor">
-            <a:schemeClr val="lt1"/>
-          </a:fontRef>
-        </p:style>
-        <p:txBody>
-          <a:bodyPr rtlCol="0" anchor="b"/>
-          <a:lstStyle/>
-          <a:p>
-            <a:r>
-              <a:rPr lang="en-US" sz="2800" dirty="0"/>
-              <a:t> </a:t>
-            </a:r>
-            <a:r>
-              <a:rPr lang="en-US" sz="2800" dirty="0">
-                <a:solidFill>
-                  <a:srgbClr val="FF0000"/>
-                </a:solidFill>
-              </a:rPr>
-              <a:t>A</a:t>
-            </a:r>
-            <a:r>
-              <a:rPr lang="en-US" sz="2800" dirty="0"/>
-              <a:t> B C D E F </a:t>
-            </a:r>
-            <a:r>
-              <a:rPr lang="en-US" sz="2800" dirty="0">
-                <a:solidFill>
-                  <a:srgbClr val="FF0000"/>
-                </a:solidFill>
-              </a:rPr>
-              <a:t>G H</a:t>
-            </a:r>
-            <a:r>
-              <a:rPr lang="en-US" sz="2800" dirty="0"/>
-              <a:t> I</a:t>
-            </a:r>
-            <a:endParaRPr lang="en-US" sz="1100" dirty="0"/>
-          </a:p>
-        </p:txBody>
-      </p:sp>
-      <p:sp>
-        <p:nvSpPr>
-          <p:cNvPr id="6" name="สี่เหลี่ยมผืนผ้า 5"/>
-          <p:cNvSpPr/>
-          <p:nvPr/>
-        </p:nvSpPr>
-        <p:spPr>
-          <a:xfrm>
-            <a:off x="2449357" y="3725452"/>
-            <a:ext cx="715617" cy="424070"/>
-          </a:xfrm>
-          <a:prstGeom prst="rect">
-            <a:avLst/>
-          </a:prstGeom>
-          <a:solidFill>
-            <a:schemeClr val="tx1">
-              <a:lumMod val="75000"/>
-              <a:lumOff val="25000"/>
-            </a:schemeClr>
-          </a:solidFill>
-          <a:ln>
-            <a:noFill/>
-          </a:ln>
-        </p:spPr>
-        <p:style>
-          <a:lnRef idx="2">
-            <a:schemeClr val="accent1">
-              <a:shade val="50000"/>
-            </a:schemeClr>
-          </a:lnRef>
-          <a:fillRef idx="1">
-            <a:schemeClr val="accent1"/>
-          </a:fillRef>
-          <a:effectRef idx="0">
-            <a:schemeClr val="accent1"/>
-          </a:effectRef>
-          <a:fontRef idx="minor">
-            <a:schemeClr val="lt1"/>
-          </a:fontRef>
-        </p:style>
-        <p:txBody>
-          <a:bodyPr rtlCol="0" anchor="ctr"/>
-          <a:lstStyle/>
-          <a:p>
-            <a:pPr algn="ctr"/>
-            <a:r>
-              <a:rPr lang="en-US" dirty="0"/>
-              <a:t>S</a:t>
-            </a:r>
-          </a:p>
-        </p:txBody>
-      </p:sp>
-      <p:sp>
-        <p:nvSpPr>
-          <p:cNvPr id="7" name="สี่เหลี่ยมผืนผ้า 6"/>
-          <p:cNvSpPr/>
-          <p:nvPr/>
-        </p:nvSpPr>
-        <p:spPr>
-          <a:xfrm>
-            <a:off x="2449357" y="3216391"/>
-            <a:ext cx="715617" cy="424070"/>
-          </a:xfrm>
-          <a:prstGeom prst="rect">
-            <a:avLst/>
-          </a:prstGeom>
-          <a:solidFill>
-            <a:schemeClr val="tx1">
-              <a:lumMod val="75000"/>
-              <a:lumOff val="25000"/>
-            </a:schemeClr>
-          </a:solidFill>
-          <a:ln>
-            <a:noFill/>
-          </a:ln>
-        </p:spPr>
-        <p:style>
-          <a:lnRef idx="2">
-            <a:schemeClr val="accent1">
-              <a:shade val="50000"/>
-            </a:schemeClr>
-          </a:lnRef>
-          <a:fillRef idx="1">
-            <a:schemeClr val="accent1"/>
-          </a:fillRef>
-          <a:effectRef idx="0">
-            <a:schemeClr val="accent1"/>
-          </a:effectRef>
-          <a:fontRef idx="minor">
-            <a:schemeClr val="lt1"/>
-          </a:fontRef>
-        </p:style>
-        <p:txBody>
-          <a:bodyPr rtlCol="0" anchor="ctr"/>
-          <a:lstStyle/>
-          <a:p>
-            <a:pPr algn="ctr"/>
-            <a:r>
-              <a:rPr lang="en-US" dirty="0"/>
-              <a:t>J</a:t>
-            </a:r>
-          </a:p>
-        </p:txBody>
-      </p:sp>
-      <p:sp>
-        <p:nvSpPr>
-          <p:cNvPr id="8" name="สี่เหลี่ยมผืนผ้า 7"/>
-          <p:cNvSpPr/>
-          <p:nvPr/>
-        </p:nvSpPr>
-        <p:spPr>
-          <a:xfrm>
-            <a:off x="2449356" y="4234513"/>
-            <a:ext cx="715617" cy="424070"/>
-          </a:xfrm>
-          <a:prstGeom prst="rect">
-            <a:avLst/>
-          </a:prstGeom>
-          <a:solidFill>
-            <a:schemeClr val="tx1">
-              <a:lumMod val="75000"/>
-              <a:lumOff val="25000"/>
-            </a:schemeClr>
-          </a:solidFill>
-          <a:ln>
-            <a:noFill/>
-          </a:ln>
-        </p:spPr>
-        <p:style>
-          <a:lnRef idx="2">
-            <a:schemeClr val="accent1">
-              <a:shade val="50000"/>
-            </a:schemeClr>
-          </a:lnRef>
-          <a:fillRef idx="1">
-            <a:schemeClr val="accent1"/>
-          </a:fillRef>
-          <a:effectRef idx="0">
-            <a:schemeClr val="accent1"/>
-          </a:effectRef>
-          <a:fontRef idx="minor">
-            <a:schemeClr val="lt1"/>
-          </a:fontRef>
-        </p:style>
-        <p:txBody>
-          <a:bodyPr rtlCol="0" anchor="ctr"/>
-          <a:lstStyle/>
-          <a:p>
-            <a:pPr algn="ctr"/>
-            <a:r>
-              <a:rPr lang="en-US" dirty="0"/>
-              <a:t>O</a:t>
-            </a:r>
-          </a:p>
-        </p:txBody>
-      </p:sp>
-      <p:sp>
-        <p:nvSpPr>
-          <p:cNvPr id="10" name="สี่เหลี่ยมผืนผ้า 9"/>
-          <p:cNvSpPr/>
-          <p:nvPr/>
-        </p:nvSpPr>
-        <p:spPr>
-          <a:xfrm>
-            <a:off x="2449355" y="4743574"/>
-            <a:ext cx="715617" cy="424070"/>
-          </a:xfrm>
-          <a:prstGeom prst="rect">
-            <a:avLst/>
-          </a:prstGeom>
-          <a:solidFill>
-            <a:schemeClr val="tx1">
-              <a:lumMod val="75000"/>
-              <a:lumOff val="25000"/>
-            </a:schemeClr>
-          </a:solidFill>
-          <a:ln>
-            <a:noFill/>
-          </a:ln>
-        </p:spPr>
-        <p:style>
-          <a:lnRef idx="2">
-            <a:schemeClr val="accent1">
-              <a:shade val="50000"/>
-            </a:schemeClr>
-          </a:lnRef>
-          <a:fillRef idx="1">
-            <a:schemeClr val="accent1"/>
-          </a:fillRef>
-          <a:effectRef idx="0">
-            <a:schemeClr val="accent1"/>
-          </a:effectRef>
-          <a:fontRef idx="minor">
-            <a:schemeClr val="lt1"/>
-          </a:fontRef>
-        </p:style>
-        <p:txBody>
-          <a:bodyPr rtlCol="0" anchor="ctr"/>
-          <a:lstStyle/>
-          <a:p>
-            <a:pPr algn="ctr"/>
-            <a:r>
-              <a:rPr lang="en-US" dirty="0"/>
-              <a:t>N</a:t>
-            </a:r>
-          </a:p>
-        </p:txBody>
-      </p:sp>
-      <p:sp>
-        <p:nvSpPr>
-          <p:cNvPr id="11" name="สี่เหลี่ยมผืนผ้า 10"/>
-          <p:cNvSpPr/>
-          <p:nvPr/>
-        </p:nvSpPr>
-        <p:spPr>
-          <a:xfrm>
-            <a:off x="5121964" y="1895061"/>
-            <a:ext cx="3600000" cy="3600000"/>
-          </a:xfrm>
-          <a:prstGeom prst="rect">
-            <a:avLst/>
-          </a:prstGeom>
-          <a:solidFill>
-            <a:schemeClr val="tx1">
-              <a:lumMod val="85000"/>
-              <a:lumOff val="15000"/>
-            </a:schemeClr>
-          </a:solidFill>
-          <a:ln>
-            <a:noFill/>
-          </a:ln>
-        </p:spPr>
-        <p:style>
-          <a:lnRef idx="2">
-            <a:schemeClr val="accent1">
-              <a:shade val="50000"/>
-            </a:schemeClr>
-          </a:lnRef>
-          <a:fillRef idx="1">
-            <a:schemeClr val="accent1"/>
-          </a:fillRef>
-          <a:effectRef idx="0">
-            <a:schemeClr val="accent1"/>
-          </a:effectRef>
-          <a:fontRef idx="minor">
-            <a:schemeClr val="lt1"/>
-          </a:fontRef>
-        </p:style>
-        <p:txBody>
-          <a:bodyPr rtlCol="0" anchor="ctr"/>
-          <a:lstStyle/>
-          <a:p>
-            <a:pPr algn="ctr"/>
-            <a:endParaRPr lang="en-US">
-              <a:solidFill>
-                <a:schemeClr val="tx1">
-                  <a:lumMod val="95000"/>
-                  <a:lumOff val="5000"/>
-                </a:schemeClr>
-              </a:solidFill>
-            </a:endParaRPr>
-          </a:p>
-        </p:txBody>
-      </p:sp>
-      <p:sp>
-        <p:nvSpPr>
-          <p:cNvPr id="17" name="กล่องข้อความ 16"/>
-          <p:cNvSpPr txBox="1"/>
-          <p:nvPr/>
-        </p:nvSpPr>
-        <p:spPr>
-          <a:xfrm>
-            <a:off x="5121963" y="2900024"/>
-            <a:ext cx="3599999" cy="1323439"/>
-          </a:xfrm>
-          <a:prstGeom prst="rect">
-            <a:avLst/>
-          </a:prstGeom>
-          <a:noFill/>
-        </p:spPr>
-        <p:txBody>
-          <a:bodyPr wrap="square" rtlCol="0">
-            <a:spAutoFit/>
-          </a:bodyPr>
-          <a:lstStyle/>
-          <a:p>
-            <a:r>
-              <a:rPr lang="en-US" sz="2000" dirty="0">
-                <a:solidFill>
-                  <a:schemeClr val="bg1"/>
-                </a:solidFill>
-              </a:rPr>
-              <a:t>1.J</a:t>
-            </a:r>
-          </a:p>
-          <a:p>
-            <a:r>
-              <a:rPr lang="en-US" sz="2000" dirty="0">
-                <a:solidFill>
-                  <a:schemeClr val="bg1"/>
-                </a:solidFill>
-              </a:rPr>
-              <a:t>2.S</a:t>
-            </a:r>
-          </a:p>
-          <a:p>
-            <a:r>
-              <a:rPr lang="en-US" sz="2000" dirty="0">
-                <a:solidFill>
-                  <a:schemeClr val="bg1"/>
-                </a:solidFill>
-              </a:rPr>
-              <a:t>3.O</a:t>
-            </a:r>
-          </a:p>
-          <a:p>
-            <a:r>
-              <a:rPr lang="en-US" sz="2000" dirty="0">
-                <a:solidFill>
-                  <a:schemeClr val="bg1"/>
-                </a:solidFill>
-              </a:rPr>
-              <a:t>4.N</a:t>
-            </a:r>
-          </a:p>
-        </p:txBody>
-      </p:sp>
-      <p:sp>
-        <p:nvSpPr>
-          <p:cNvPr id="12" name="สี่เหลี่ยมผืนผ้า 11"/>
-          <p:cNvSpPr/>
-          <p:nvPr/>
-        </p:nvSpPr>
-        <p:spPr>
-          <a:xfrm>
-            <a:off x="5121964" y="1895061"/>
-            <a:ext cx="3600000" cy="993913"/>
-          </a:xfrm>
-          <a:prstGeom prst="rect">
-            <a:avLst/>
-          </a:prstGeom>
-          <a:solidFill>
-            <a:schemeClr val="tx1">
-              <a:lumMod val="75000"/>
-              <a:lumOff val="25000"/>
-            </a:schemeClr>
-          </a:solidFill>
-          <a:ln>
-            <a:noFill/>
-          </a:ln>
-        </p:spPr>
-        <p:style>
-          <a:lnRef idx="2">
-            <a:schemeClr val="accent1">
-              <a:shade val="50000"/>
-            </a:schemeClr>
-          </a:lnRef>
-          <a:fillRef idx="1">
-            <a:schemeClr val="accent1"/>
-          </a:fillRef>
-          <a:effectRef idx="0">
-            <a:schemeClr val="accent1"/>
-          </a:effectRef>
-          <a:fontRef idx="minor">
-            <a:schemeClr val="lt1"/>
-          </a:fontRef>
-        </p:style>
-        <p:txBody>
-          <a:bodyPr rtlCol="0" anchor="b"/>
-          <a:lstStyle/>
-          <a:p>
-            <a:r>
-              <a:rPr lang="en-US" sz="2800" dirty="0"/>
-              <a:t> </a:t>
-            </a:r>
-            <a:r>
-              <a:rPr lang="en-US" sz="2800" dirty="0">
-                <a:solidFill>
-                  <a:srgbClr val="FF0000"/>
-                </a:solidFill>
-              </a:rPr>
-              <a:t>A</a:t>
-            </a:r>
-            <a:r>
-              <a:rPr lang="en-US" sz="2800" dirty="0"/>
-              <a:t> B C D E F </a:t>
-            </a:r>
-            <a:r>
-              <a:rPr lang="en-US" sz="2800" dirty="0">
-                <a:solidFill>
-                  <a:srgbClr val="FF0000"/>
-                </a:solidFill>
-              </a:rPr>
-              <a:t>G H</a:t>
-            </a:r>
-            <a:r>
-              <a:rPr lang="en-US" sz="2800" dirty="0"/>
-              <a:t> I</a:t>
-            </a:r>
-            <a:endParaRPr lang="en-US" sz="1100" dirty="0"/>
-          </a:p>
-        </p:txBody>
-      </p:sp>
-      <p:sp>
-        <p:nvSpPr>
-          <p:cNvPr id="13" name="สี่เหลี่ยมผืนผ้า 12"/>
-          <p:cNvSpPr/>
-          <p:nvPr/>
-        </p:nvSpPr>
-        <p:spPr>
-          <a:xfrm>
-            <a:off x="6136768" y="4928715"/>
-            <a:ext cx="715617" cy="424070"/>
-          </a:xfrm>
-          <a:prstGeom prst="rect">
-            <a:avLst/>
-          </a:prstGeom>
-          <a:solidFill>
-            <a:schemeClr val="tx1">
-              <a:lumMod val="75000"/>
-              <a:lumOff val="25000"/>
-            </a:schemeClr>
-          </a:solidFill>
-          <a:ln>
-            <a:noFill/>
-          </a:ln>
-        </p:spPr>
-        <p:style>
-          <a:lnRef idx="2">
-            <a:schemeClr val="accent1">
-              <a:shade val="50000"/>
-            </a:schemeClr>
-          </a:lnRef>
-          <a:fillRef idx="1">
-            <a:schemeClr val="accent1"/>
-          </a:fillRef>
-          <a:effectRef idx="0">
-            <a:schemeClr val="accent1"/>
-          </a:effectRef>
-          <a:fontRef idx="minor">
-            <a:schemeClr val="lt1"/>
-          </a:fontRef>
-        </p:style>
-        <p:txBody>
-          <a:bodyPr rtlCol="0" anchor="ctr"/>
-          <a:lstStyle/>
-          <a:p>
-            <a:pPr algn="ctr"/>
-            <a:r>
-              <a:rPr lang="en-US" dirty="0"/>
-              <a:t>2</a:t>
-            </a:r>
-          </a:p>
-        </p:txBody>
-      </p:sp>
-      <p:sp>
-        <p:nvSpPr>
-          <p:cNvPr id="14" name="สี่เหลี่ยมผืนผ้า 13"/>
-          <p:cNvSpPr/>
-          <p:nvPr/>
-        </p:nvSpPr>
-        <p:spPr>
-          <a:xfrm>
-            <a:off x="5284339" y="4928715"/>
-            <a:ext cx="715617" cy="424070"/>
-          </a:xfrm>
-          <a:prstGeom prst="rect">
-            <a:avLst/>
-          </a:prstGeom>
-          <a:solidFill>
-            <a:schemeClr val="tx1">
-              <a:lumMod val="75000"/>
-              <a:lumOff val="25000"/>
-            </a:schemeClr>
-          </a:solidFill>
-          <a:ln>
-            <a:noFill/>
-          </a:ln>
-        </p:spPr>
-        <p:style>
-          <a:lnRef idx="2">
-            <a:schemeClr val="accent1">
-              <a:shade val="50000"/>
-            </a:schemeClr>
-          </a:lnRef>
-          <a:fillRef idx="1">
-            <a:schemeClr val="accent1"/>
-          </a:fillRef>
-          <a:effectRef idx="0">
-            <a:schemeClr val="accent1"/>
-          </a:effectRef>
-          <a:fontRef idx="minor">
-            <a:schemeClr val="lt1"/>
-          </a:fontRef>
-        </p:style>
-        <p:txBody>
-          <a:bodyPr rtlCol="0" anchor="ctr"/>
-          <a:lstStyle/>
-          <a:p>
-            <a:pPr algn="ctr"/>
-            <a:r>
-              <a:rPr lang="en-US" dirty="0"/>
-              <a:t>1</a:t>
-            </a:r>
-          </a:p>
-        </p:txBody>
-      </p:sp>
-      <p:sp>
-        <p:nvSpPr>
-          <p:cNvPr id="15" name="สี่เหลี่ยมผืนผ้า 14"/>
-          <p:cNvSpPr/>
-          <p:nvPr/>
-        </p:nvSpPr>
-        <p:spPr>
-          <a:xfrm>
-            <a:off x="6989197" y="4928715"/>
-            <a:ext cx="715617" cy="424070"/>
-          </a:xfrm>
-          <a:prstGeom prst="rect">
-            <a:avLst/>
-          </a:prstGeom>
-          <a:solidFill>
-            <a:schemeClr val="tx1">
-              <a:lumMod val="75000"/>
-              <a:lumOff val="25000"/>
-            </a:schemeClr>
-          </a:solidFill>
-          <a:ln>
-            <a:noFill/>
-          </a:ln>
-        </p:spPr>
-        <p:style>
-          <a:lnRef idx="2">
-            <a:schemeClr val="accent1">
-              <a:shade val="50000"/>
-            </a:schemeClr>
-          </a:lnRef>
-          <a:fillRef idx="1">
-            <a:schemeClr val="accent1"/>
-          </a:fillRef>
-          <a:effectRef idx="0">
-            <a:schemeClr val="accent1"/>
-          </a:effectRef>
-          <a:fontRef idx="minor">
-            <a:schemeClr val="lt1"/>
-          </a:fontRef>
-        </p:style>
-        <p:txBody>
-          <a:bodyPr rtlCol="0" anchor="ctr"/>
-          <a:lstStyle/>
-          <a:p>
-            <a:pPr algn="ctr"/>
-            <a:r>
-              <a:rPr lang="en-US" dirty="0"/>
-              <a:t>3</a:t>
-            </a:r>
-          </a:p>
-        </p:txBody>
-      </p:sp>
-      <p:sp>
-        <p:nvSpPr>
-          <p:cNvPr id="16" name="สี่เหลี่ยมผืนผ้า 15"/>
-          <p:cNvSpPr/>
-          <p:nvPr/>
-        </p:nvSpPr>
-        <p:spPr>
-          <a:xfrm>
-            <a:off x="7841626" y="4928715"/>
-            <a:ext cx="715617" cy="424070"/>
-          </a:xfrm>
-          <a:prstGeom prst="rect">
-            <a:avLst/>
-          </a:prstGeom>
-          <a:solidFill>
-            <a:schemeClr val="tx1">
-              <a:lumMod val="75000"/>
-              <a:lumOff val="25000"/>
-            </a:schemeClr>
-          </a:solidFill>
-          <a:ln>
-            <a:noFill/>
-          </a:ln>
-        </p:spPr>
-        <p:style>
-          <a:lnRef idx="2">
-            <a:schemeClr val="accent1">
-              <a:shade val="50000"/>
-            </a:schemeClr>
-          </a:lnRef>
-          <a:fillRef idx="1">
-            <a:schemeClr val="accent1"/>
-          </a:fillRef>
-          <a:effectRef idx="0">
-            <a:schemeClr val="accent1"/>
-          </a:effectRef>
-          <a:fontRef idx="minor">
-            <a:schemeClr val="lt1"/>
-          </a:fontRef>
-        </p:style>
-        <p:txBody>
-          <a:bodyPr rtlCol="0" anchor="ctr"/>
-          <a:lstStyle/>
-          <a:p>
-            <a:pPr algn="ctr"/>
-            <a:r>
-              <a:rPr lang="en-US" dirty="0"/>
-              <a:t>4</a:t>
-            </a:r>
-          </a:p>
-        </p:txBody>
-      </p:sp>
+            </a:ln>
+          </p:spPr>
+          <p:style>
+            <a:lnRef idx="2">
+              <a:schemeClr val="accent1">
+                <a:shade val="50000"/>
+              </a:schemeClr>
+            </a:lnRef>
+            <a:fillRef idx="1">
+              <a:schemeClr val="accent1"/>
+            </a:fillRef>
+            <a:effectRef idx="0">
+              <a:schemeClr val="accent1"/>
+            </a:effectRef>
+            <a:fontRef idx="minor">
+              <a:schemeClr val="lt1"/>
+            </a:fontRef>
+          </p:style>
+          <p:txBody>
+            <a:bodyPr rtlCol="0" anchor="ctr"/>
+            <a:lstStyle/>
+            <a:p>
+              <a:pPr algn="ctr"/>
+              <a:endParaRPr lang="th-TH"/>
+            </a:p>
+          </p:txBody>
+        </p:sp>
+      </p:grpSp>
     </p:spTree>
     <p:extLst>
       <p:ext uri="{BB962C8B-B14F-4D97-AF65-F5344CB8AC3E}">

</xml_diff>

<commit_message>
Half working "Note" page
</commit_message>
<xml_diff>
--- a/AppIcon.pptx
+++ b/AppIcon.pptx
@@ -7,6 +7,7 @@
   <p:sldIdLst>
     <p:sldId id="256" r:id="rId2"/>
     <p:sldId id="257" r:id="rId3"/>
+    <p:sldId id="258" r:id="rId4"/>
   </p:sldIdLst>
   <p:sldSz cx="12192000" cy="6858000"/>
   <p:notesSz cx="6858000" cy="9144000"/>
@@ -113,6 +114,10 @@
 </p:presentation>
 </file>
 
+<file path=ppt/revisionInfo.xml><?xml version="1.0" encoding="utf-8"?>
+<p1510:revInfo xmlns:a="http://schemas.openxmlformats.org/drawingml/2006/main" xmlns:r="http://schemas.openxmlformats.org/officeDocument/2006/relationships" xmlns:p1510="http://schemas.microsoft.com/office/powerpoint/2015/10/main"/>
+</file>
+
 <file path=ppt/slideLayouts/slideLayout1.xml><?xml version="1.0" encoding="utf-8"?>
 <p:sldLayout xmlns:a="http://schemas.openxmlformats.org/drawingml/2006/main" xmlns:r="http://schemas.openxmlformats.org/officeDocument/2006/relationships" xmlns:p="http://schemas.openxmlformats.org/presentationml/2006/main" type="title" preserve="1">
   <p:cSld name="สไลด์ชื่อเรื่อง">
@@ -244,7 +249,7 @@
           <a:p>
             <a:fld id="{C5FE4084-FD05-412E-B791-C7FAFC4BFF5D}" type="datetimeFigureOut">
               <a:rPr lang="en-US" smtClean="0"/>
-              <a:t>1/2/2017</a:t>
+              <a:t>5/13/2017</a:t>
             </a:fld>
             <a:endParaRPr lang="en-US"/>
           </a:p>
@@ -414,7 +419,7 @@
           <a:p>
             <a:fld id="{C5FE4084-FD05-412E-B791-C7FAFC4BFF5D}" type="datetimeFigureOut">
               <a:rPr lang="en-US" smtClean="0"/>
-              <a:t>1/2/2017</a:t>
+              <a:t>5/13/2017</a:t>
             </a:fld>
             <a:endParaRPr lang="en-US"/>
           </a:p>
@@ -594,7 +599,7 @@
           <a:p>
             <a:fld id="{C5FE4084-FD05-412E-B791-C7FAFC4BFF5D}" type="datetimeFigureOut">
               <a:rPr lang="en-US" smtClean="0"/>
-              <a:t>1/2/2017</a:t>
+              <a:t>5/13/2017</a:t>
             </a:fld>
             <a:endParaRPr lang="en-US"/>
           </a:p>
@@ -764,7 +769,7 @@
           <a:p>
             <a:fld id="{C5FE4084-FD05-412E-B791-C7FAFC4BFF5D}" type="datetimeFigureOut">
               <a:rPr lang="en-US" smtClean="0"/>
-              <a:t>1/2/2017</a:t>
+              <a:t>5/13/2017</a:t>
             </a:fld>
             <a:endParaRPr lang="en-US"/>
           </a:p>
@@ -1010,7 +1015,7 @@
           <a:p>
             <a:fld id="{C5FE4084-FD05-412E-B791-C7FAFC4BFF5D}" type="datetimeFigureOut">
               <a:rPr lang="en-US" smtClean="0"/>
-              <a:t>1/2/2017</a:t>
+              <a:t>5/13/2017</a:t>
             </a:fld>
             <a:endParaRPr lang="en-US"/>
           </a:p>
@@ -1242,7 +1247,7 @@
           <a:p>
             <a:fld id="{C5FE4084-FD05-412E-B791-C7FAFC4BFF5D}" type="datetimeFigureOut">
               <a:rPr lang="en-US" smtClean="0"/>
-              <a:t>1/2/2017</a:t>
+              <a:t>5/13/2017</a:t>
             </a:fld>
             <a:endParaRPr lang="en-US"/>
           </a:p>
@@ -1609,7 +1614,7 @@
           <a:p>
             <a:fld id="{C5FE4084-FD05-412E-B791-C7FAFC4BFF5D}" type="datetimeFigureOut">
               <a:rPr lang="en-US" smtClean="0"/>
-              <a:t>1/2/2017</a:t>
+              <a:t>5/13/2017</a:t>
             </a:fld>
             <a:endParaRPr lang="en-US"/>
           </a:p>
@@ -1727,7 +1732,7 @@
           <a:p>
             <a:fld id="{C5FE4084-FD05-412E-B791-C7FAFC4BFF5D}" type="datetimeFigureOut">
               <a:rPr lang="en-US" smtClean="0"/>
-              <a:t>1/2/2017</a:t>
+              <a:t>5/13/2017</a:t>
             </a:fld>
             <a:endParaRPr lang="en-US"/>
           </a:p>
@@ -1822,7 +1827,7 @@
           <a:p>
             <a:fld id="{C5FE4084-FD05-412E-B791-C7FAFC4BFF5D}" type="datetimeFigureOut">
               <a:rPr lang="en-US" smtClean="0"/>
-              <a:t>1/2/2017</a:t>
+              <a:t>5/13/2017</a:t>
             </a:fld>
             <a:endParaRPr lang="en-US"/>
           </a:p>
@@ -2099,7 +2104,7 @@
           <a:p>
             <a:fld id="{C5FE4084-FD05-412E-B791-C7FAFC4BFF5D}" type="datetimeFigureOut">
               <a:rPr lang="en-US" smtClean="0"/>
-              <a:t>1/2/2017</a:t>
+              <a:t>5/13/2017</a:t>
             </a:fld>
             <a:endParaRPr lang="en-US"/>
           </a:p>
@@ -2352,7 +2357,7 @@
           <a:p>
             <a:fld id="{C5FE4084-FD05-412E-B791-C7FAFC4BFF5D}" type="datetimeFigureOut">
               <a:rPr lang="en-US" smtClean="0"/>
-              <a:t>1/2/2017</a:t>
+              <a:t>5/13/2017</a:t>
             </a:fld>
             <a:endParaRPr lang="en-US"/>
           </a:p>
@@ -2571,7 +2576,7 @@
           <a:p>
             <a:fld id="{C5FE4084-FD05-412E-B791-C7FAFC4BFF5D}" type="datetimeFigureOut">
               <a:rPr lang="en-US" smtClean="0"/>
-              <a:t>1/2/2017</a:t>
+              <a:t>5/13/2017</a:t>
             </a:fld>
             <a:endParaRPr lang="en-US"/>
           </a:p>
@@ -5108,6 +5113,67 @@
 </p:sld>
 </file>
 
+<file path=ppt/slides/slide3.xml><?xml version="1.0" encoding="utf-8"?>
+<p:sld xmlns:a="http://schemas.openxmlformats.org/drawingml/2006/main" xmlns:r="http://schemas.openxmlformats.org/officeDocument/2006/relationships" xmlns:p="http://schemas.openxmlformats.org/presentationml/2006/main">
+  <p:cSld>
+    <p:spTree>
+      <p:nvGrpSpPr>
+        <p:cNvPr id="1" name=""/>
+        <p:cNvGrpSpPr/>
+        <p:nvPr/>
+      </p:nvGrpSpPr>
+      <p:grpSpPr>
+        <a:xfrm>
+          <a:off x="0" y="0"/>
+          <a:ext cx="0" cy="0"/>
+          <a:chOff x="0" y="0"/>
+          <a:chExt cx="0" cy="0"/>
+        </a:xfrm>
+      </p:grpSpPr>
+      <p:sp>
+        <p:nvSpPr>
+          <p:cNvPr id="4" name="กล่องข้อความ 3"/>
+          <p:cNvSpPr txBox="1"/>
+          <p:nvPr/>
+        </p:nvSpPr>
+        <p:spPr>
+          <a:xfrm>
+            <a:off x="238539" y="357809"/>
+            <a:ext cx="45719" cy="369332"/>
+          </a:xfrm>
+          <a:prstGeom prst="rect">
+            <a:avLst/>
+          </a:prstGeom>
+          <a:noFill/>
+        </p:spPr>
+        <p:txBody>
+          <a:bodyPr wrap="square" rtlCol="0">
+            <a:spAutoFit/>
+          </a:bodyPr>
+          <a:lstStyle/>
+          <a:p>
+            <a:r>
+              <a:rPr lang="en-US" dirty="0">
+                <a:latin typeface="Segoe MDL2 Assets" panose="050A0102010101010101" pitchFamily="18" charset="0"/>
+              </a:rPr>
+              <a:t></a:t>
+            </a:r>
+          </a:p>
+        </p:txBody>
+      </p:sp>
+    </p:spTree>
+    <p:extLst>
+      <p:ext uri="{BB962C8B-B14F-4D97-AF65-F5344CB8AC3E}">
+        <p14:creationId xmlns:p14="http://schemas.microsoft.com/office/powerpoint/2010/main" val="1685796336"/>
+      </p:ext>
+    </p:extLst>
+  </p:cSld>
+  <p:clrMapOvr>
+    <a:masterClrMapping/>
+  </p:clrMapOvr>
+</p:sld>
+</file>
+
 <file path=ppt/theme/theme1.xml><?xml version="1.0" encoding="utf-8"?>
 <a:theme xmlns:a="http://schemas.openxmlformats.org/drawingml/2006/main" name="ธีมของ Office">
   <a:themeElements>

</xml_diff>